<commit_message>
Improved notation and bullet points in slides, fixed annimtions
</commit_message>
<xml_diff>
--- a/slides/4_DistanceAndSimilarityMeasures.pptx
+++ b/slides/4_DistanceAndSimilarityMeasures.pptx
@@ -242,7 +242,7 @@
           <a:p>
             <a:fld id="{8DD534D1-5B48-49E9-A024-C5EAE54CADD0}" type="datetimeFigureOut">
               <a:rPr lang="en-US" smtClean="0"/>
-              <a:t>7/7/2025</a:t>
+              <a:t>10/1/2025</a:t>
             </a:fld>
             <a:endParaRPr lang="en-US"/>
           </a:p>
@@ -4104,7 +4104,7 @@
           <a:p>
             <a:fld id="{9DC183D5-83EE-4A48-BB2E-1FC30CD8E44A}" type="datetimeFigureOut">
               <a:rPr lang="en-US" smtClean="0"/>
-              <a:t>7/7/2025</a:t>
+              <a:t>10/1/2025</a:t>
             </a:fld>
             <a:endParaRPr lang="en-US"/>
           </a:p>
@@ -4302,7 +4302,7 @@
           <a:p>
             <a:fld id="{9DC183D5-83EE-4A48-BB2E-1FC30CD8E44A}" type="datetimeFigureOut">
               <a:rPr lang="en-US" smtClean="0"/>
-              <a:t>7/7/2025</a:t>
+              <a:t>10/1/2025</a:t>
             </a:fld>
             <a:endParaRPr lang="en-US"/>
           </a:p>
@@ -4510,7 +4510,7 @@
           <a:p>
             <a:fld id="{9DC183D5-83EE-4A48-BB2E-1FC30CD8E44A}" type="datetimeFigureOut">
               <a:rPr lang="en-US" smtClean="0"/>
-              <a:t>7/7/2025</a:t>
+              <a:t>10/1/2025</a:t>
             </a:fld>
             <a:endParaRPr lang="en-US"/>
           </a:p>
@@ -4880,7 +4880,7 @@
           <a:p>
             <a:fld id="{9DC183D5-83EE-4A48-BB2E-1FC30CD8E44A}" type="datetimeFigureOut">
               <a:rPr lang="en-US" smtClean="0"/>
-              <a:t>7/7/2025</a:t>
+              <a:t>10/1/2025</a:t>
             </a:fld>
             <a:endParaRPr lang="en-US"/>
           </a:p>
@@ -5155,7 +5155,7 @@
           <a:p>
             <a:fld id="{9DC183D5-83EE-4A48-BB2E-1FC30CD8E44A}" type="datetimeFigureOut">
               <a:rPr lang="en-US" smtClean="0"/>
-              <a:t>7/7/2025</a:t>
+              <a:t>10/1/2025</a:t>
             </a:fld>
             <a:endParaRPr lang="en-US"/>
           </a:p>
@@ -5420,7 +5420,7 @@
           <a:p>
             <a:fld id="{9DC183D5-83EE-4A48-BB2E-1FC30CD8E44A}" type="datetimeFigureOut">
               <a:rPr lang="en-US" smtClean="0"/>
-              <a:t>7/7/2025</a:t>
+              <a:t>10/1/2025</a:t>
             </a:fld>
             <a:endParaRPr lang="en-US"/>
           </a:p>
@@ -5832,7 +5832,7 @@
           <a:p>
             <a:fld id="{9DC183D5-83EE-4A48-BB2E-1FC30CD8E44A}" type="datetimeFigureOut">
               <a:rPr lang="en-US" smtClean="0"/>
-              <a:t>7/7/2025</a:t>
+              <a:t>10/1/2025</a:t>
             </a:fld>
             <a:endParaRPr lang="en-US"/>
           </a:p>
@@ -5973,7 +5973,7 @@
           <a:p>
             <a:fld id="{9DC183D5-83EE-4A48-BB2E-1FC30CD8E44A}" type="datetimeFigureOut">
               <a:rPr lang="en-US" smtClean="0"/>
-              <a:t>7/7/2025</a:t>
+              <a:t>10/1/2025</a:t>
             </a:fld>
             <a:endParaRPr lang="en-US"/>
           </a:p>
@@ -6086,7 +6086,7 @@
           <a:p>
             <a:fld id="{9DC183D5-83EE-4A48-BB2E-1FC30CD8E44A}" type="datetimeFigureOut">
               <a:rPr lang="en-US" smtClean="0"/>
-              <a:t>7/7/2025</a:t>
+              <a:t>10/1/2025</a:t>
             </a:fld>
             <a:endParaRPr lang="en-US"/>
           </a:p>
@@ -6397,7 +6397,7 @@
           <a:p>
             <a:fld id="{9DC183D5-83EE-4A48-BB2E-1FC30CD8E44A}" type="datetimeFigureOut">
               <a:rPr lang="en-US" smtClean="0"/>
-              <a:t>7/7/2025</a:t>
+              <a:t>10/1/2025</a:t>
             </a:fld>
             <a:endParaRPr lang="en-US"/>
           </a:p>
@@ -6685,7 +6685,7 @@
           <a:p>
             <a:fld id="{9DC183D5-83EE-4A48-BB2E-1FC30CD8E44A}" type="datetimeFigureOut">
               <a:rPr lang="en-US" smtClean="0"/>
-              <a:t>7/7/2025</a:t>
+              <a:t>10/1/2025</a:t>
             </a:fld>
             <a:endParaRPr lang="en-US"/>
           </a:p>
@@ -6926,7 +6926,7 @@
           <a:p>
             <a:fld id="{9DC183D5-83EE-4A48-BB2E-1FC30CD8E44A}" type="datetimeFigureOut">
               <a:rPr lang="en-US" smtClean="0"/>
-              <a:t>7/7/2025</a:t>
+              <a:t>10/1/2025</a:t>
             </a:fld>
             <a:endParaRPr lang="en-US"/>
           </a:p>
@@ -9997,7 +9997,7 @@
                   <a:rPr lang="en-US" dirty="0">
                     <a:latin typeface="+mn-lt"/>
                   </a:rPr>
-                  <a:t>Unweighted sum of squares and Euclidian distance</a:t>
+                  <a:t>Square root of the sum of squares is the Euclidian distance</a:t>
                 </a:r>
               </a:p>
               <a:p>
@@ -16310,6 +16310,14 @@
               <a:rPr lang="en-US" dirty="0">
                 <a:latin typeface="+mn-lt"/>
               </a:rPr>
+              <a:t>Document and image search</a:t>
+            </a:r>
+          </a:p>
+          <a:p>
+            <a:r>
+              <a:rPr lang="en-US" dirty="0">
+                <a:latin typeface="+mn-lt"/>
+              </a:rPr>
               <a:t>Retrieval augmented generation (RAG)</a:t>
             </a:r>
           </a:p>
@@ -16635,6 +16643,55 @@
                                           <p:spTgt spid="3">
                                             <p:txEl>
                                               <p:pRg st="6" end="6"/>
+                                            </p:txEl>
+                                          </p:spTgt>
+                                        </p:tgtEl>
+                                        <p:attrNameLst>
+                                          <p:attrName>style.visibility</p:attrName>
+                                        </p:attrNameLst>
+                                      </p:cBhvr>
+                                      <p:to>
+                                        <p:strVal val="visible"/>
+                                      </p:to>
+                                    </p:set>
+                                  </p:childTnLst>
+                                </p:cTn>
+                              </p:par>
+                            </p:childTnLst>
+                          </p:cTn>
+                        </p:par>
+                      </p:childTnLst>
+                    </p:cTn>
+                  </p:par>
+                  <p:par>
+                    <p:cTn id="27" fill="hold">
+                      <p:stCondLst>
+                        <p:cond delay="indefinite"/>
+                      </p:stCondLst>
+                      <p:childTnLst>
+                        <p:par>
+                          <p:cTn id="28" fill="hold">
+                            <p:stCondLst>
+                              <p:cond delay="0"/>
+                            </p:stCondLst>
+                            <p:childTnLst>
+                              <p:par>
+                                <p:cTn id="29" presetID="1" presetClass="entr" presetSubtype="0" fill="hold" nodeType="clickEffect">
+                                  <p:stCondLst>
+                                    <p:cond delay="0"/>
+                                  </p:stCondLst>
+                                  <p:childTnLst>
+                                    <p:set>
+                                      <p:cBhvr>
+                                        <p:cTn id="30" dur="1" fill="hold">
+                                          <p:stCondLst>
+                                            <p:cond delay="0"/>
+                                          </p:stCondLst>
+                                        </p:cTn>
+                                        <p:tgtEl>
+                                          <p:spTgt spid="3">
+                                            <p:txEl>
+                                              <p:pRg st="7" end="7"/>
                                             </p:txEl>
                                           </p:spTgt>
                                         </p:tgtEl>
@@ -24161,14 +24218,6 @@
               <a:rPr lang="en-US" dirty="0">
                 <a:latin typeface="+mn-lt"/>
               </a:rPr>
-              <a:t>Improving LLM responses (RAG)</a:t>
-            </a:r>
-          </a:p>
-          <a:p>
-            <a:r>
-              <a:rPr lang="en-US" dirty="0">
-                <a:latin typeface="+mn-lt"/>
-              </a:rPr>
               <a:t>And many others……………….. </a:t>
             </a:r>
           </a:p>
@@ -24544,55 +24593,6 @@
                       </p:childTnLst>
                     </p:cTn>
                   </p:par>
-                  <p:par>
-                    <p:cTn id="31" fill="hold">
-                      <p:stCondLst>
-                        <p:cond delay="indefinite"/>
-                      </p:stCondLst>
-                      <p:childTnLst>
-                        <p:par>
-                          <p:cTn id="32" fill="hold">
-                            <p:stCondLst>
-                              <p:cond delay="0"/>
-                            </p:stCondLst>
-                            <p:childTnLst>
-                              <p:par>
-                                <p:cTn id="33" presetID="1" presetClass="entr" presetSubtype="0" fill="hold" nodeType="clickEffect">
-                                  <p:stCondLst>
-                                    <p:cond delay="0"/>
-                                  </p:stCondLst>
-                                  <p:childTnLst>
-                                    <p:set>
-                                      <p:cBhvr>
-                                        <p:cTn id="34" dur="1" fill="hold">
-                                          <p:stCondLst>
-                                            <p:cond delay="0"/>
-                                          </p:stCondLst>
-                                        </p:cTn>
-                                        <p:tgtEl>
-                                          <p:spTgt spid="3">
-                                            <p:txEl>
-                                              <p:pRg st="8" end="8"/>
-                                            </p:txEl>
-                                          </p:spTgt>
-                                        </p:tgtEl>
-                                        <p:attrNameLst>
-                                          <p:attrName>style.visibility</p:attrName>
-                                        </p:attrNameLst>
-                                      </p:cBhvr>
-                                      <p:to>
-                                        <p:strVal val="visible"/>
-                                      </p:to>
-                                    </p:set>
-                                  </p:childTnLst>
-                                </p:cTn>
-                              </p:par>
-                            </p:childTnLst>
-                          </p:cTn>
-                        </p:par>
-                      </p:childTnLst>
-                    </p:cTn>
-                  </p:par>
                 </p:childTnLst>
               </p:cTn>
               <p:prevCondLst>
@@ -24664,101 +24664,297 @@
           </a:p>
         </p:txBody>
       </p:sp>
-      <p:sp>
-        <p:nvSpPr>
-          <p:cNvPr id="3" name="Content Placeholder 2"/>
-          <p:cNvSpPr>
-            <a:spLocks noGrp="1"/>
-          </p:cNvSpPr>
-          <p:nvPr>
-            <p:ph sz="quarter" idx="10"/>
-          </p:nvPr>
-        </p:nvSpPr>
-        <p:spPr>
-          <a:xfrm>
-            <a:off x="333375" y="896079"/>
-            <a:ext cx="11525250" cy="5698998"/>
-          </a:xfrm>
-        </p:spPr>
-        <p:txBody>
-          <a:bodyPr>
-            <a:normAutofit/>
-          </a:bodyPr>
-          <a:lstStyle/>
-          <a:p>
-            <a:r>
-              <a:rPr lang="en-US" dirty="0">
-                <a:latin typeface="+mn-lt"/>
-              </a:rPr>
-              <a:t>How much do different metrics matter?</a:t>
-            </a:r>
-          </a:p>
-          <a:p>
-            <a:r>
-              <a:rPr lang="en-US" dirty="0">
-                <a:latin typeface="+mn-lt"/>
-              </a:rPr>
-              <a:t>A lot!</a:t>
-            </a:r>
-          </a:p>
-          <a:p>
-            <a:r>
-              <a:rPr lang="en-US" dirty="0">
-                <a:latin typeface="+mn-lt"/>
-              </a:rPr>
-              <a:t>Compare dissimilarity metrics between the restaurants</a:t>
-            </a:r>
-          </a:p>
-          <a:p>
-            <a:endParaRPr lang="en-US" dirty="0">
-              <a:latin typeface="+mn-lt"/>
-            </a:endParaRPr>
-          </a:p>
-          <a:p>
-            <a:endParaRPr lang="en-US" dirty="0">
-              <a:latin typeface="+mn-lt"/>
-            </a:endParaRPr>
-          </a:p>
-          <a:p>
-            <a:endParaRPr lang="en-US" dirty="0">
-              <a:latin typeface="+mn-lt"/>
-            </a:endParaRPr>
-          </a:p>
-          <a:p>
-            <a:r>
-              <a:rPr lang="en-US" dirty="0">
-                <a:latin typeface="+mn-lt"/>
-              </a:rPr>
-              <a:t>The </a:t>
-            </a:r>
-            <a:r>
-              <a:rPr lang="en-US" dirty="0" err="1">
-                <a:latin typeface="+mn-lt"/>
-              </a:rPr>
-              <a:t>Euclidiean</a:t>
-            </a:r>
-            <a:r>
-              <a:rPr lang="en-US" dirty="0">
-                <a:latin typeface="+mn-lt"/>
-              </a:rPr>
-              <a:t> distance emphasizes larger differences in feature values  </a:t>
-            </a:r>
-          </a:p>
-          <a:p>
-            <a:r>
-              <a:rPr lang="en-US" dirty="0">
-                <a:latin typeface="+mn-lt"/>
-              </a:rPr>
-              <a:t>Manhattan distance less sensitive to extreme differences </a:t>
-            </a:r>
-          </a:p>
-          <a:p>
-            <a:endParaRPr lang="en-US" dirty="0">
-              <a:latin typeface="+mn-lt"/>
-            </a:endParaRPr>
-          </a:p>
-        </p:txBody>
-      </p:sp>
+      <mc:AlternateContent xmlns:mc="http://schemas.openxmlformats.org/markup-compatibility/2006" xmlns:a14="http://schemas.microsoft.com/office/drawing/2010/main">
+        <mc:Choice Requires="a14">
+          <p:sp>
+            <p:nvSpPr>
+              <p:cNvPr id="3" name="Content Placeholder 2"/>
+              <p:cNvSpPr>
+                <a:spLocks noGrp="1"/>
+              </p:cNvSpPr>
+              <p:nvPr>
+                <p:ph sz="quarter" idx="10"/>
+              </p:nvPr>
+            </p:nvSpPr>
+            <p:spPr>
+              <a:xfrm>
+                <a:off x="333375" y="896079"/>
+                <a:ext cx="11525250" cy="5698998"/>
+              </a:xfrm>
+            </p:spPr>
+            <p:txBody>
+              <a:bodyPr>
+                <a:normAutofit/>
+              </a:bodyPr>
+              <a:lstStyle/>
+              <a:p>
+                <a:pPr marL="0" indent="0">
+                  <a:buNone/>
+                </a:pPr>
+                <a:r>
+                  <a:rPr lang="en-US" dirty="0">
+                    <a:latin typeface="+mn-lt"/>
+                  </a:rPr>
+                  <a:t>How much do different metrics matter?</a:t>
+                </a:r>
+              </a:p>
+              <a:p>
+                <a:r>
+                  <a:rPr lang="en-US" dirty="0">
+                    <a:latin typeface="+mn-lt"/>
+                  </a:rPr>
+                  <a:t>A lot!</a:t>
+                </a:r>
+              </a:p>
+              <a:p>
+                <a:r>
+                  <a:rPr lang="en-US" dirty="0">
+                    <a:latin typeface="+mn-lt"/>
+                  </a:rPr>
+                  <a:t>Compare dissimilarity metrics between the restaurants</a:t>
+                </a:r>
+              </a:p>
+              <a:p>
+                <a:endParaRPr lang="en-US" dirty="0">
+                  <a:latin typeface="+mn-lt"/>
+                </a:endParaRPr>
+              </a:p>
+              <a:p>
+                <a:endParaRPr lang="en-US" dirty="0">
+                  <a:latin typeface="+mn-lt"/>
+                </a:endParaRPr>
+              </a:p>
+              <a:p>
+                <a:endParaRPr lang="en-US" dirty="0">
+                  <a:latin typeface="+mn-lt"/>
+                </a:endParaRPr>
+              </a:p>
+              <a:p>
+                <a:r>
+                  <a:rPr lang="en-US" dirty="0">
+                    <a:latin typeface="+mn-lt"/>
+                  </a:rPr>
+                  <a:t>Manhattan distance, </a:t>
+                </a:r>
+                <a14:m>
+                  <m:oMath xmlns:m="http://schemas.openxmlformats.org/officeDocument/2006/math">
+                    <m:sSub>
+                      <m:sSubPr>
+                        <m:ctrlPr>
+                          <a:rPr lang="en-US" i="1" smtClean="0">
+                            <a:latin typeface="Cambria Math" panose="02040503050406030204" pitchFamily="18" charset="0"/>
+                          </a:rPr>
+                        </m:ctrlPr>
+                      </m:sSubPr>
+                      <m:e>
+                        <m:r>
+                          <a:rPr lang="en-US" b="0" i="1" smtClean="0">
+                            <a:latin typeface="Cambria Math" panose="02040503050406030204" pitchFamily="18" charset="0"/>
+                          </a:rPr>
+                          <m:t>𝐿</m:t>
+                        </m:r>
+                      </m:e>
+                      <m:sub>
+                        <m:r>
+                          <a:rPr lang="en-US" b="0" i="1" smtClean="0">
+                            <a:latin typeface="Cambria Math" panose="02040503050406030204" pitchFamily="18" charset="0"/>
+                          </a:rPr>
+                          <m:t>1</m:t>
+                        </m:r>
+                      </m:sub>
+                    </m:sSub>
+                  </m:oMath>
+                </a14:m>
+                <a:r>
+                  <a:rPr lang="en-US" dirty="0">
+                    <a:latin typeface="+mn-lt"/>
+                  </a:rPr>
+                  <a:t>, less sensitive to extreme differences </a:t>
+                </a:r>
+              </a:p>
+              <a:p>
+                <a:pPr marL="457200" lvl="1" indent="0">
+                  <a:buNone/>
+                </a:pPr>
+                <a14:m>
+                  <m:oMathPara xmlns:m="http://schemas.openxmlformats.org/officeDocument/2006/math">
+                    <m:oMathParaPr>
+                      <m:jc m:val="centerGroup"/>
+                    </m:oMathParaPr>
+                    <m:oMath xmlns:m="http://schemas.openxmlformats.org/officeDocument/2006/math">
+                      <m:f>
+                        <m:fPr>
+                          <m:ctrlPr>
+                            <a:rPr lang="en-US" i="1" smtClean="0">
+                              <a:latin typeface="Cambria Math" panose="02040503050406030204" pitchFamily="18" charset="0"/>
+                            </a:rPr>
+                          </m:ctrlPr>
+                        </m:fPr>
+                        <m:num>
+                          <m:r>
+                            <a:rPr lang="en-US" b="0" i="1" smtClean="0">
+                              <a:latin typeface="Cambria Math" panose="02040503050406030204" pitchFamily="18" charset="0"/>
+                            </a:rPr>
+                            <m:t>0.42</m:t>
+                          </m:r>
+                        </m:num>
+                        <m:den>
+                          <m:r>
+                            <a:rPr lang="en-US" b="0" i="1" smtClean="0">
+                              <a:latin typeface="Cambria Math" panose="02040503050406030204" pitchFamily="18" charset="0"/>
+                            </a:rPr>
+                            <m:t>0.21</m:t>
+                          </m:r>
+                        </m:den>
+                      </m:f>
+                      <m:r>
+                        <a:rPr lang="en-US" b="0" i="1" smtClean="0">
+                          <a:latin typeface="Cambria Math" panose="02040503050406030204" pitchFamily="18" charset="0"/>
+                        </a:rPr>
+                        <m:t>=2.0</m:t>
+                      </m:r>
+                    </m:oMath>
+                  </m:oMathPara>
+                </a14:m>
+                <a:endParaRPr lang="en-US" dirty="0">
+                  <a:latin typeface="+mn-lt"/>
+                </a:endParaRPr>
+              </a:p>
+              <a:p>
+                <a:r>
+                  <a:rPr lang="en-US" dirty="0">
+                    <a:latin typeface="+mn-lt"/>
+                  </a:rPr>
+                  <a:t>The Euclidean, </a:t>
+                </a:r>
+                <a14:m>
+                  <m:oMath xmlns:m="http://schemas.openxmlformats.org/officeDocument/2006/math">
+                    <m:sSub>
+                      <m:sSubPr>
+                        <m:ctrlPr>
+                          <a:rPr lang="en-US" i="1">
+                            <a:latin typeface="Cambria Math" panose="02040503050406030204" pitchFamily="18" charset="0"/>
+                          </a:rPr>
+                        </m:ctrlPr>
+                      </m:sSubPr>
+                      <m:e>
+                        <m:r>
+                          <a:rPr lang="en-US" i="1">
+                            <a:latin typeface="Cambria Math" panose="02040503050406030204" pitchFamily="18" charset="0"/>
+                          </a:rPr>
+                          <m:t>𝐿</m:t>
+                        </m:r>
+                      </m:e>
+                      <m:sub>
+                        <m:r>
+                          <a:rPr lang="en-US" i="1">
+                            <a:latin typeface="Cambria Math" panose="02040503050406030204" pitchFamily="18" charset="0"/>
+                          </a:rPr>
+                          <m:t>2</m:t>
+                        </m:r>
+                      </m:sub>
+                    </m:sSub>
+                  </m:oMath>
+                </a14:m>
+                <a:r>
+                  <a:rPr lang="en-US" dirty="0">
+                    <a:latin typeface="+mn-lt"/>
+                  </a:rPr>
+                  <a:t>, distance emphasizes larger differences in feature values  </a:t>
+                </a:r>
+              </a:p>
+              <a:p>
+                <a:pPr marL="457200" lvl="1" indent="0">
+                  <a:buNone/>
+                </a:pPr>
+                <a14:m>
+                  <m:oMathPara xmlns:m="http://schemas.openxmlformats.org/officeDocument/2006/math">
+                    <m:oMathParaPr>
+                      <m:jc m:val="centerGroup"/>
+                    </m:oMathParaPr>
+                    <m:oMath xmlns:m="http://schemas.openxmlformats.org/officeDocument/2006/math">
+                      <m:f>
+                        <m:fPr>
+                          <m:ctrlPr>
+                            <a:rPr lang="en-US" i="1">
+                              <a:latin typeface="Cambria Math" panose="02040503050406030204" pitchFamily="18" charset="0"/>
+                            </a:rPr>
+                          </m:ctrlPr>
+                        </m:fPr>
+                        <m:num>
+                          <m:r>
+                            <a:rPr lang="en-US" i="1">
+                              <a:latin typeface="Cambria Math" panose="02040503050406030204" pitchFamily="18" charset="0"/>
+                            </a:rPr>
+                            <m:t>0.22</m:t>
+                          </m:r>
+                        </m:num>
+                        <m:den>
+                          <m:r>
+                            <a:rPr lang="en-US" i="1">
+                              <a:latin typeface="Cambria Math" panose="02040503050406030204" pitchFamily="18" charset="0"/>
+                            </a:rPr>
+                            <m:t>0.085</m:t>
+                          </m:r>
+                        </m:den>
+                      </m:f>
+                      <m:r>
+                        <a:rPr lang="en-US" i="1">
+                          <a:latin typeface="Cambria Math" panose="02040503050406030204" pitchFamily="18" charset="0"/>
+                        </a:rPr>
+                        <m:t>=2.6</m:t>
+                      </m:r>
+                    </m:oMath>
+                  </m:oMathPara>
+                </a14:m>
+                <a:endParaRPr lang="en-US" dirty="0"/>
+              </a:p>
+              <a:p>
+                <a:endParaRPr lang="en-US" dirty="0">
+                  <a:latin typeface="+mn-lt"/>
+                </a:endParaRPr>
+              </a:p>
+            </p:txBody>
+          </p:sp>
+        </mc:Choice>
+        <mc:Fallback xmlns="">
+          <p:sp>
+            <p:nvSpPr>
+              <p:cNvPr id="3" name="Content Placeholder 2"/>
+              <p:cNvSpPr>
+                <a:spLocks noGrp="1" noRot="1" noChangeAspect="1" noMove="1" noResize="1" noEditPoints="1" noAdjustHandles="1" noChangeArrowheads="1" noChangeShapeType="1" noTextEdit="1"/>
+              </p:cNvSpPr>
+              <p:nvPr>
+                <p:ph sz="quarter" idx="10"/>
+              </p:nvPr>
+            </p:nvSpPr>
+            <p:spPr>
+              <a:xfrm>
+                <a:off x="333375" y="896079"/>
+                <a:ext cx="11525250" cy="5698998"/>
+              </a:xfrm>
+              <a:blipFill>
+                <a:blip r:embed="rId3"/>
+                <a:stretch>
+                  <a:fillRect l="-1111" t="-1818"/>
+                </a:stretch>
+              </a:blipFill>
+            </p:spPr>
+            <p:txBody>
+              <a:bodyPr/>
+              <a:lstStyle/>
+              <a:p>
+                <a:r>
+                  <a:rPr lang="en-US">
+                    <a:noFill/>
+                  </a:rPr>
+                  <a:t> </a:t>
+                </a:r>
+              </a:p>
+            </p:txBody>
+          </p:sp>
+        </mc:Fallback>
+      </mc:AlternateContent>
       <p:graphicFrame>
         <p:nvGraphicFramePr>
           <p:cNvPr id="5" name="Table 5">
@@ -24774,7 +24970,7 @@
           <p:nvPr>
             <p:extLst>
               <p:ext uri="{D42A27DB-BD31-4B8C-83A1-F6EECF244321}">
-                <p14:modId xmlns:p14="http://schemas.microsoft.com/office/powerpoint/2010/main" val="782348863"/>
+                <p14:modId xmlns:p14="http://schemas.microsoft.com/office/powerpoint/2010/main" val="1696918281"/>
               </p:ext>
             </p:extLst>
           </p:nvPr>
@@ -24917,7 +25113,7 @@
                             <a:schemeClr val="tx1"/>
                           </a:solidFill>
                         </a:rPr>
-                        <a:t>0.22</a:t>
+                        <a:t>0.21</a:t>
                       </a:r>
                     </a:p>
                   </a:txBody>
@@ -24959,7 +25155,7 @@
                             <a:schemeClr val="tx1"/>
                           </a:solidFill>
                         </a:rPr>
-                        <a:t>0.6</a:t>
+                        <a:t>0.22</a:t>
                       </a:r>
                     </a:p>
                   </a:txBody>
@@ -24977,7 +25173,7 @@
                             <a:schemeClr val="tx1"/>
                           </a:solidFill>
                         </a:rPr>
-                        <a:t>0.3</a:t>
+                        <a:t>0.085</a:t>
                       </a:r>
                     </a:p>
                   </a:txBody>
@@ -25039,7 +25235,7 @@
                                         <p:tgtEl>
                                           <p:spTgt spid="3">
                                             <p:txEl>
-                                              <p:pRg st="0" end="0"/>
+                                              <p:pRg st="1" end="1"/>
                                             </p:txEl>
                                           </p:spTgt>
                                         </p:tgtEl>
@@ -25088,55 +25284,6 @@
                                         <p:tgtEl>
                                           <p:spTgt spid="3">
                                             <p:txEl>
-                                              <p:pRg st="1" end="1"/>
-                                            </p:txEl>
-                                          </p:spTgt>
-                                        </p:tgtEl>
-                                        <p:attrNameLst>
-                                          <p:attrName>style.visibility</p:attrName>
-                                        </p:attrNameLst>
-                                      </p:cBhvr>
-                                      <p:to>
-                                        <p:strVal val="visible"/>
-                                      </p:to>
-                                    </p:set>
-                                  </p:childTnLst>
-                                </p:cTn>
-                              </p:par>
-                            </p:childTnLst>
-                          </p:cTn>
-                        </p:par>
-                      </p:childTnLst>
-                    </p:cTn>
-                  </p:par>
-                  <p:par>
-                    <p:cTn id="11" fill="hold">
-                      <p:stCondLst>
-                        <p:cond delay="indefinite"/>
-                      </p:stCondLst>
-                      <p:childTnLst>
-                        <p:par>
-                          <p:cTn id="12" fill="hold">
-                            <p:stCondLst>
-                              <p:cond delay="0"/>
-                            </p:stCondLst>
-                            <p:childTnLst>
-                              <p:par>
-                                <p:cTn id="13" presetID="1" presetClass="entr" presetSubtype="0" fill="hold" nodeType="clickEffect">
-                                  <p:stCondLst>
-                                    <p:cond delay="0"/>
-                                  </p:stCondLst>
-                                  <p:childTnLst>
-                                    <p:set>
-                                      <p:cBhvr>
-                                        <p:cTn id="14" dur="1" fill="hold">
-                                          <p:stCondLst>
-                                            <p:cond delay="0"/>
-                                          </p:stCondLst>
-                                        </p:cTn>
-                                        <p:tgtEl>
-                                          <p:spTgt spid="3">
-                                            <p:txEl>
                                               <p:pRg st="2" end="2"/>
                                             </p:txEl>
                                           </p:spTgt>
@@ -25153,14 +25300,14 @@
                                 </p:cTn>
                               </p:par>
                               <p:par>
-                                <p:cTn id="15" presetID="1" presetClass="entr" presetSubtype="0" fill="hold" nodeType="withEffect">
+                                <p:cTn id="11" presetID="1" presetClass="entr" presetSubtype="0" fill="hold" nodeType="withEffect">
                                   <p:stCondLst>
                                     <p:cond delay="0"/>
                                   </p:stCondLst>
                                   <p:childTnLst>
                                     <p:set>
                                       <p:cBhvr>
-                                        <p:cTn id="16" dur="1" fill="hold">
+                                        <p:cTn id="12" dur="1" fill="hold">
                                           <p:stCondLst>
                                             <p:cond delay="0"/>
                                           </p:stCondLst>
@@ -25186,26 +25333,26 @@
                     </p:cTn>
                   </p:par>
                   <p:par>
-                    <p:cTn id="17" fill="hold">
+                    <p:cTn id="13" fill="hold">
                       <p:stCondLst>
                         <p:cond delay="indefinite"/>
                       </p:stCondLst>
                       <p:childTnLst>
                         <p:par>
-                          <p:cTn id="18" fill="hold">
+                          <p:cTn id="14" fill="hold">
                             <p:stCondLst>
                               <p:cond delay="0"/>
                             </p:stCondLst>
                             <p:childTnLst>
                               <p:par>
-                                <p:cTn id="19" presetID="1" presetClass="entr" presetSubtype="0" fill="hold" nodeType="clickEffect">
+                                <p:cTn id="15" presetID="1" presetClass="entr" presetSubtype="0" fill="hold" nodeType="clickEffect">
                                   <p:stCondLst>
                                     <p:cond delay="0"/>
                                   </p:stCondLst>
                                   <p:childTnLst>
                                     <p:set>
                                       <p:cBhvr>
-                                        <p:cTn id="20" dur="1" fill="hold">
+                                        <p:cTn id="16" dur="1" fill="hold">
                                           <p:stCondLst>
                                             <p:cond delay="0"/>
                                           </p:stCondLst>
@@ -25228,6 +25375,37 @@
                                   </p:childTnLst>
                                 </p:cTn>
                               </p:par>
+                              <p:par>
+                                <p:cTn id="17" presetID="1" presetClass="entr" presetSubtype="0" fill="hold" nodeType="withEffect">
+                                  <p:stCondLst>
+                                    <p:cond delay="0"/>
+                                  </p:stCondLst>
+                                  <p:childTnLst>
+                                    <p:set>
+                                      <p:cBhvr>
+                                        <p:cTn id="18" dur="1" fill="hold">
+                                          <p:stCondLst>
+                                            <p:cond delay="0"/>
+                                          </p:stCondLst>
+                                        </p:cTn>
+                                        <p:tgtEl>
+                                          <p:spTgt spid="3">
+                                            <p:txEl>
+                                              <p:pRg st="7" end="7"/>
+                                            </p:txEl>
+                                          </p:spTgt>
+                                        </p:tgtEl>
+                                        <p:attrNameLst>
+                                          <p:attrName>style.visibility</p:attrName>
+                                        </p:attrNameLst>
+                                      </p:cBhvr>
+                                      <p:to>
+                                        <p:strVal val="visible"/>
+                                      </p:to>
+                                    </p:set>
+                                  </p:childTnLst>
+                                </p:cTn>
+                              </p:par>
                             </p:childTnLst>
                           </p:cTn>
                         </p:par>
@@ -25235,19 +25413,50 @@
                     </p:cTn>
                   </p:par>
                   <p:par>
-                    <p:cTn id="21" fill="hold">
+                    <p:cTn id="19" fill="hold">
                       <p:stCondLst>
                         <p:cond delay="indefinite"/>
                       </p:stCondLst>
                       <p:childTnLst>
                         <p:par>
-                          <p:cTn id="22" fill="hold">
+                          <p:cTn id="20" fill="hold">
                             <p:stCondLst>
                               <p:cond delay="0"/>
                             </p:stCondLst>
                             <p:childTnLst>
                               <p:par>
-                                <p:cTn id="23" presetID="1" presetClass="entr" presetSubtype="0" fill="hold" nodeType="clickEffect">
+                                <p:cTn id="21" presetID="1" presetClass="entr" presetSubtype="0" fill="hold" nodeType="clickEffect">
+                                  <p:stCondLst>
+                                    <p:cond delay="0"/>
+                                  </p:stCondLst>
+                                  <p:childTnLst>
+                                    <p:set>
+                                      <p:cBhvr>
+                                        <p:cTn id="22" dur="1" fill="hold">
+                                          <p:stCondLst>
+                                            <p:cond delay="0"/>
+                                          </p:stCondLst>
+                                        </p:cTn>
+                                        <p:tgtEl>
+                                          <p:spTgt spid="3">
+                                            <p:txEl>
+                                              <p:pRg st="8" end="8"/>
+                                            </p:txEl>
+                                          </p:spTgt>
+                                        </p:tgtEl>
+                                        <p:attrNameLst>
+                                          <p:attrName>style.visibility</p:attrName>
+                                        </p:attrNameLst>
+                                      </p:cBhvr>
+                                      <p:to>
+                                        <p:strVal val="visible"/>
+                                      </p:to>
+                                    </p:set>
+                                  </p:childTnLst>
+                                </p:cTn>
+                              </p:par>
+                              <p:par>
+                                <p:cTn id="23" presetID="1" presetClass="entr" presetSubtype="0" fill="hold" nodeType="withEffect">
                                   <p:stCondLst>
                                     <p:cond delay="0"/>
                                   </p:stCondLst>
@@ -25262,7 +25471,7 @@
                                         <p:tgtEl>
                                           <p:spTgt spid="3">
                                             <p:txEl>
-                                              <p:pRg st="7" end="7"/>
+                                              <p:pRg st="9" end="9"/>
                                             </p:txEl>
                                           </p:spTgt>
                                         </p:tgtEl>
@@ -26070,8 +26279,8 @@
           </a:p>
         </p:txBody>
       </p:sp>
-      <mc:AlternateContent xmlns:mc="http://schemas.openxmlformats.org/markup-compatibility/2006">
-        <mc:Choice xmlns:a14="http://schemas.microsoft.com/office/drawing/2010/main" Requires="a14">
+      <mc:AlternateContent xmlns:mc="http://schemas.openxmlformats.org/markup-compatibility/2006" xmlns:a14="http://schemas.microsoft.com/office/drawing/2010/main">
+        <mc:Choice Requires="a14">
           <p:sp>
             <p:nvSpPr>
               <p:cNvPr id="3" name="Content Placeholder 2"/>
@@ -26707,7 +26916,7 @@
             </p:txBody>
           </p:sp>
         </mc:Choice>
-        <mc:Fallback>
+        <mc:Fallback xmlns="">
           <p:sp>
             <p:nvSpPr>
               <p:cNvPr id="3" name="Content Placeholder 2"/>
@@ -30855,8 +31064,8 @@
           </a:p>
         </p:txBody>
       </p:sp>
-      <mc:AlternateContent xmlns:mc="http://schemas.openxmlformats.org/markup-compatibility/2006">
-        <mc:Choice xmlns:a14="http://schemas.microsoft.com/office/drawing/2010/main" Requires="a14">
+      <mc:AlternateContent xmlns:mc="http://schemas.openxmlformats.org/markup-compatibility/2006" xmlns:a14="http://schemas.microsoft.com/office/drawing/2010/main">
+        <mc:Choice Requires="a14">
           <p:sp>
             <p:nvSpPr>
               <p:cNvPr id="3" name="Content Placeholder 2">
@@ -31342,7 +31551,7 @@
             </p:txBody>
           </p:sp>
         </mc:Choice>
-        <mc:Fallback>
+        <mc:Fallback xmlns="">
           <p:sp>
             <p:nvSpPr>
               <p:cNvPr id="3" name="Content Placeholder 2">
@@ -37594,13 +37803,13 @@
         </p:spPr>
         <p:txBody>
           <a:bodyPr>
-            <a:normAutofit fontScale="90000"/>
+            <a:noAutofit/>
           </a:bodyPr>
           <a:lstStyle/>
           <a:p>
             <a:r>
-              <a:rPr lang="en-US" dirty="0"/>
-              <a:t>Scaling distance and similarity measures</a:t>
+              <a:rPr lang="en-US" sz="3600" dirty="0"/>
+              <a:t>Massively scaling distance and similarity measures</a:t>
             </a:r>
           </a:p>
         </p:txBody>
@@ -37806,7 +38015,19 @@
                   <a:rPr lang="en-US" dirty="0">
                     <a:latin typeface="+mn-lt"/>
                   </a:rPr>
-                  <a:t>How can we do better?    </a:t>
+                  <a:t>How can we </a:t>
+                </a:r>
+                <a:r>
+                  <a:rPr lang="en-US" b="1" dirty="0">
+                    <a:latin typeface="+mn-lt"/>
+                  </a:rPr>
+                  <a:t>massively scale</a:t>
+                </a:r>
+                <a:r>
+                  <a:rPr lang="en-US" dirty="0">
+                    <a:latin typeface="+mn-lt"/>
+                  </a:rPr>
+                  <a:t>?    </a:t>
                 </a:r>
               </a:p>
               <a:p>
@@ -37814,7 +38035,7 @@
                   <a:rPr lang="en-US" b="1" dirty="0">
                     <a:latin typeface="+mn-lt"/>
                   </a:rPr>
-                  <a:t>Use a sparse graph representation!</a:t>
+                  <a:t>Use an approximate sparse graph representation!</a:t>
                 </a:r>
               </a:p>
               <a:p>
@@ -37822,7 +38043,40 @@
                   <a:rPr lang="en-US" dirty="0">
                     <a:latin typeface="+mn-lt"/>
                   </a:rPr>
-                  <a:t>Then apply distance measure along graph edges </a:t>
+                  <a:t>Compute distance or similarity metric along graph edges </a:t>
+                </a:r>
+              </a:p>
+              <a:p>
+                <a:pPr lvl="1"/>
+                <a:r>
+                  <a:rPr lang="en-US" dirty="0">
+                    <a:latin typeface="+mn-lt"/>
+                  </a:rPr>
+                  <a:t>Only consider metric between </a:t>
+                </a:r>
+                <a:r>
+                  <a:rPr lang="en-US" b="1" dirty="0">
+                    <a:latin typeface="+mn-lt"/>
+                  </a:rPr>
+                  <a:t>nearest neighbors (NNs)</a:t>
+                </a:r>
+              </a:p>
+              <a:p>
+                <a:pPr lvl="1"/>
+                <a:r>
+                  <a:rPr lang="en-US" dirty="0">
+                    <a:latin typeface="+mn-lt"/>
+                  </a:rPr>
+                  <a:t>Nearest neighbors are most important </a:t>
+                </a:r>
+              </a:p>
+              <a:p>
+                <a:pPr lvl="1"/>
+                <a:r>
+                  <a:rPr lang="en-US" dirty="0">
+                    <a:latin typeface="+mn-lt"/>
+                  </a:rPr>
+                  <a:t>The nearest neighbor approximation </a:t>
                 </a:r>
               </a:p>
               <a:p>
@@ -37836,7 +38090,7 @@
                     </a:solidFill>
                     <a:latin typeface="+mn-lt"/>
                   </a:rPr>
-                  <a:t>Don’t confuse this idea with clustering models!</a:t>
+                  <a:t>Don’t confuse this idea with clustering models! – No cluster assignment</a:t>
                 </a:r>
               </a:p>
               <a:p>
@@ -38047,26 +38301,39 @@
                                   </p:childTnLst>
                                 </p:cTn>
                               </p:par>
-                            </p:childTnLst>
-                          </p:cTn>
-                        </p:par>
-                      </p:childTnLst>
-                    </p:cTn>
-                  </p:par>
-                  <p:par>
-                    <p:cTn id="15" fill="hold">
-                      <p:stCondLst>
-                        <p:cond delay="indefinite"/>
-                      </p:stCondLst>
-                      <p:childTnLst>
-                        <p:par>
-                          <p:cTn id="16" fill="hold">
-                            <p:stCondLst>
-                              <p:cond delay="0"/>
-                            </p:stCondLst>
-                            <p:childTnLst>
                               <p:par>
-                                <p:cTn id="17" presetID="1" presetClass="entr" presetSubtype="0" fill="hold" nodeType="clickEffect">
+                                <p:cTn id="15" presetID="1" presetClass="entr" presetSubtype="0" fill="hold" nodeType="withEffect">
+                                  <p:stCondLst>
+                                    <p:cond delay="0"/>
+                                  </p:stCondLst>
+                                  <p:childTnLst>
+                                    <p:set>
+                                      <p:cBhvr>
+                                        <p:cTn id="16" dur="1" fill="hold">
+                                          <p:stCondLst>
+                                            <p:cond delay="0"/>
+                                          </p:stCondLst>
+                                        </p:cTn>
+                                        <p:tgtEl>
+                                          <p:spTgt spid="3">
+                                            <p:txEl>
+                                              <p:pRg st="5" end="5"/>
+                                            </p:txEl>
+                                          </p:spTgt>
+                                        </p:tgtEl>
+                                        <p:attrNameLst>
+                                          <p:attrName>style.visibility</p:attrName>
+                                        </p:attrNameLst>
+                                      </p:cBhvr>
+                                      <p:to>
+                                        <p:strVal val="visible"/>
+                                      </p:to>
+                                    </p:set>
+                                  </p:childTnLst>
+                                </p:cTn>
+                              </p:par>
+                              <p:par>
+                                <p:cTn id="17" presetID="1" presetClass="entr" presetSubtype="0" fill="hold" nodeType="withEffect">
                                   <p:stCondLst>
                                     <p:cond delay="0"/>
                                   </p:stCondLst>
@@ -38081,7 +38348,87 @@
                                         <p:tgtEl>
                                           <p:spTgt spid="3">
                                             <p:txEl>
-                                              <p:pRg st="5" end="5"/>
+                                              <p:pRg st="6" end="6"/>
+                                            </p:txEl>
+                                          </p:spTgt>
+                                        </p:tgtEl>
+                                        <p:attrNameLst>
+                                          <p:attrName>style.visibility</p:attrName>
+                                        </p:attrNameLst>
+                                      </p:cBhvr>
+                                      <p:to>
+                                        <p:strVal val="visible"/>
+                                      </p:to>
+                                    </p:set>
+                                  </p:childTnLst>
+                                </p:cTn>
+                              </p:par>
+                              <p:par>
+                                <p:cTn id="19" presetID="1" presetClass="entr" presetSubtype="0" fill="hold" nodeType="withEffect">
+                                  <p:stCondLst>
+                                    <p:cond delay="0"/>
+                                  </p:stCondLst>
+                                  <p:childTnLst>
+                                    <p:set>
+                                      <p:cBhvr>
+                                        <p:cTn id="20" dur="1" fill="hold">
+                                          <p:stCondLst>
+                                            <p:cond delay="0"/>
+                                          </p:stCondLst>
+                                        </p:cTn>
+                                        <p:tgtEl>
+                                          <p:spTgt spid="3">
+                                            <p:txEl>
+                                              <p:pRg st="7" end="7"/>
+                                            </p:txEl>
+                                          </p:spTgt>
+                                        </p:tgtEl>
+                                        <p:attrNameLst>
+                                          <p:attrName>style.visibility</p:attrName>
+                                        </p:attrNameLst>
+                                      </p:cBhvr>
+                                      <p:to>
+                                        <p:strVal val="visible"/>
+                                      </p:to>
+                                    </p:set>
+                                  </p:childTnLst>
+                                </p:cTn>
+                              </p:par>
+                            </p:childTnLst>
+                          </p:cTn>
+                        </p:par>
+                      </p:childTnLst>
+                    </p:cTn>
+                  </p:par>
+                  <p:par>
+                    <p:cTn id="21" fill="hold">
+                      <p:stCondLst>
+                        <p:cond delay="indefinite"/>
+                      </p:stCondLst>
+                      <p:childTnLst>
+                        <p:par>
+                          <p:cTn id="22" fill="hold">
+                            <p:stCondLst>
+                              <p:cond delay="0"/>
+                            </p:stCondLst>
+                            <p:childTnLst>
+                              <p:par>
+                                <p:cTn id="23" presetID="1" presetClass="entr" presetSubtype="0" fill="hold" nodeType="clickEffect">
+                                  <p:stCondLst>
+                                    <p:cond delay="0"/>
+                                  </p:stCondLst>
+                                  <p:childTnLst>
+                                    <p:set>
+                                      <p:cBhvr>
+                                        <p:cTn id="24" dur="1" fill="hold">
+                                          <p:stCondLst>
+                                            <p:cond delay="0"/>
+                                          </p:stCondLst>
+                                        </p:cTn>
+                                        <p:tgtEl>
+                                          <p:spTgt spid="3">
+                                            <p:txEl>
+                                              <p:pRg st="8" end="8"/>
                                             </p:txEl>
                                           </p:spTgt>
                                         </p:tgtEl>
@@ -38162,13 +38509,13 @@
         </p:spPr>
         <p:txBody>
           <a:bodyPr>
-            <a:normAutofit fontScale="90000"/>
+            <a:noAutofit/>
           </a:bodyPr>
           <a:lstStyle/>
           <a:p>
             <a:r>
-              <a:rPr lang="en-US" dirty="0"/>
-              <a:t>Scaling distance and similarity measures</a:t>
+              <a:rPr lang="en-US" sz="3600" dirty="0"/>
+              <a:t>Massively scaling distance and similarity measures</a:t>
             </a:r>
           </a:p>
         </p:txBody>
@@ -38323,7 +38670,7 @@
               <a:rPr lang="en-US" dirty="0">
                 <a:latin typeface="+mn-lt"/>
               </a:rPr>
-              <a:t>Only compute and store measure for edges between nearest neighbors    </a:t>
+              <a:t>Neglect metric for less important distant nodes</a:t>
             </a:r>
           </a:p>
           <a:p>
@@ -38695,7 +39042,7 @@
 </file>
 
 <file path=ppt/slides/slide44.xml><?xml version="1.0" encoding="utf-8"?>
-<p:sld xmlns:a="http://schemas.openxmlformats.org/drawingml/2006/main" xmlns:r="http://schemas.openxmlformats.org/officeDocument/2006/relationships" xmlns:p="http://schemas.openxmlformats.org/presentationml/2006/main" show="0">
+<p:sld xmlns:a="http://schemas.openxmlformats.org/drawingml/2006/main" xmlns:r="http://schemas.openxmlformats.org/officeDocument/2006/relationships" xmlns:p="http://schemas.openxmlformats.org/presentationml/2006/main">
   <p:cSld>
     <p:spTree>
       <p:nvGrpSpPr>
@@ -38826,8 +39173,8 @@
             </p:nvSpPr>
             <p:spPr>
               <a:xfrm>
-                <a:off x="396498" y="1709893"/>
-                <a:ext cx="5584552" cy="3539430"/>
+                <a:off x="396497" y="1709893"/>
+                <a:ext cx="6058732" cy="3970318"/>
               </a:xfrm>
               <a:prstGeom prst="rect">
                 <a:avLst/>
@@ -38870,7 +39217,7 @@
                 </a:r>
               </a:p>
               <a:p>
-                <a:pPr marL="285750" indent="-285750">
+                <a:pPr marL="742950" lvl="1" indent="-285750">
                   <a:buFont typeface="Arial" panose="020B0604020202020204" pitchFamily="34" charset="0"/>
                   <a:buChar char="•"/>
                 </a:pPr>
@@ -38922,7 +39269,7 @@
                 </a:r>
               </a:p>
               <a:p>
-                <a:pPr marL="285750" indent="-285750">
+                <a:pPr marL="742950" lvl="1" indent="-285750">
                   <a:buFont typeface="Arial" panose="020B0604020202020204" pitchFamily="34" charset="0"/>
                   <a:buChar char="•"/>
                 </a:pPr>
@@ -38978,7 +39325,7 @@
                 <a:endParaRPr lang="en-US" sz="2800" dirty="0"/>
               </a:p>
               <a:p>
-                <a:pPr marL="285750" indent="-285750">
+                <a:pPr marL="742950" lvl="1" indent="-285750">
                   <a:buFont typeface="Arial" panose="020B0604020202020204" pitchFamily="34" charset="0"/>
                   <a:buChar char="•"/>
                 </a:pPr>
@@ -39034,7 +39381,56 @@
                 <a:endParaRPr lang="en-US" sz="2800" dirty="0"/>
               </a:p>
               <a:p>
-                <a:pPr marL="285750" indent="-285750">
+                <a:pPr marL="742950" lvl="1" indent="-285750">
+                  <a:buFont typeface="Arial" panose="020B0604020202020204" pitchFamily="34" charset="0"/>
+                  <a:buChar char="•"/>
+                </a:pPr>
+                <a:r>
+                  <a:rPr lang="en-US" sz="2800" dirty="0"/>
+                  <a:t>Lower </a:t>
+                </a:r>
+                <a14:m>
+                  <m:oMath xmlns:m="http://schemas.openxmlformats.org/officeDocument/2006/math">
+                    <m:r>
+                      <a:rPr lang="en-US" sz="2800" i="1">
+                        <a:latin typeface="Cambria Math" panose="02040503050406030204" pitchFamily="18" charset="0"/>
+                      </a:rPr>
+                      <m:t>𝑟</m:t>
+                    </m:r>
+                    <m:r>
+                      <a:rPr lang="en-US" sz="2800" i="1">
+                        <a:latin typeface="Cambria Math" panose="02040503050406030204" pitchFamily="18" charset="0"/>
+                        <a:ea typeface="Cambria Math" panose="02040503050406030204" pitchFamily="18" charset="0"/>
+                      </a:rPr>
+                      <m:t>⟶</m:t>
+                    </m:r>
+                    <m:r>
+                      <a:rPr lang="en-US" sz="2800" b="0" i="1" smtClean="0">
+                        <a:latin typeface="Cambria Math" panose="02040503050406030204" pitchFamily="18" charset="0"/>
+                        <a:ea typeface="Cambria Math" panose="02040503050406030204" pitchFamily="18" charset="0"/>
+                      </a:rPr>
+                      <m:t>𝑚𝑜𝑟𝑒</m:t>
+                    </m:r>
+                    <m:r>
+                      <a:rPr lang="en-US" sz="2800" b="0" i="1" smtClean="0">
+                        <a:latin typeface="Cambria Math" panose="02040503050406030204" pitchFamily="18" charset="0"/>
+                        <a:ea typeface="Cambria Math" panose="02040503050406030204" pitchFamily="18" charset="0"/>
+                      </a:rPr>
+                      <m:t> </m:t>
+                    </m:r>
+                    <m:r>
+                      <a:rPr lang="en-US" sz="2800" b="0" i="1" smtClean="0">
+                        <a:latin typeface="Cambria Math" panose="02040503050406030204" pitchFamily="18" charset="0"/>
+                        <a:ea typeface="Cambria Math" panose="02040503050406030204" pitchFamily="18" charset="0"/>
+                      </a:rPr>
+                      <m:t>𝑎𝑝𝑝𝑟𝑜𝑥𝑖𝑚𝑎𝑡𝑒</m:t>
+                    </m:r>
+                  </m:oMath>
+                </a14:m>
+                <a:endParaRPr lang="en-US" sz="2800" dirty="0"/>
+              </a:p>
+              <a:p>
+                <a:pPr marL="742950" lvl="1" indent="-285750">
                   <a:buFont typeface="Arial" panose="020B0604020202020204" pitchFamily="34" charset="0"/>
                   <a:buChar char="•"/>
                 </a:pPr>
@@ -39102,8 +39498,8 @@
             </p:nvSpPr>
             <p:spPr>
               <a:xfrm>
-                <a:off x="396498" y="1709893"/>
-                <a:ext cx="5584552" cy="3539430"/>
+                <a:off x="396497" y="1709893"/>
+                <a:ext cx="6058732" cy="3970318"/>
               </a:xfrm>
               <a:prstGeom prst="rect">
                 <a:avLst/>
@@ -39111,7 +39507,7 @@
               <a:blipFill>
                 <a:blip r:embed="rId4"/>
                 <a:stretch>
-                  <a:fillRect l="-1965" t="-1549" r="-4367" b="-3959"/>
+                  <a:fillRect l="-1811" t="-1380" b="-3374"/>
                 </a:stretch>
               </a:blipFill>
             </p:spPr>
@@ -39191,43 +39587,21 @@
                                   </p:childTnLst>
                                 </p:cTn>
                               </p:par>
-                            </p:childTnLst>
-                          </p:cTn>
-                        </p:par>
-                      </p:childTnLst>
-                    </p:cTn>
-                  </p:par>
-                  <p:par>
-                    <p:cTn id="7" fill="hold">
-                      <p:stCondLst>
-                        <p:cond delay="indefinite"/>
-                      </p:stCondLst>
-                      <p:childTnLst>
-                        <p:par>
-                          <p:cTn id="8" fill="hold">
-                            <p:stCondLst>
-                              <p:cond delay="0"/>
-                            </p:stCondLst>
-                            <p:childTnLst>
                               <p:par>
-                                <p:cTn id="9" presetID="1" presetClass="entr" presetSubtype="0" fill="hold" nodeType="clickEffect">
+                                <p:cTn id="7" presetID="1" presetClass="entr" presetSubtype="0" fill="hold" nodeType="withEffect">
                                   <p:stCondLst>
                                     <p:cond delay="0"/>
                                   </p:stCondLst>
                                   <p:childTnLst>
                                     <p:set>
                                       <p:cBhvr>
-                                        <p:cTn id="10" dur="1" fill="hold">
+                                        <p:cTn id="8" dur="1" fill="hold">
                                           <p:stCondLst>
                                             <p:cond delay="0"/>
                                           </p:stCondLst>
                                         </p:cTn>
                                         <p:tgtEl>
-                                          <p:spTgt spid="6">
-                                            <p:txEl>
-                                              <p:pRg st="1" end="1"/>
-                                            </p:txEl>
-                                          </p:spTgt>
+                                          <p:spTgt spid="5"/>
                                         </p:tgtEl>
                                         <p:attrNameLst>
                                           <p:attrName>style.visibility</p:attrName>
@@ -39240,8 +39614,26 @@
                                   </p:childTnLst>
                                 </p:cTn>
                               </p:par>
+                            </p:childTnLst>
+                          </p:cTn>
+                        </p:par>
+                      </p:childTnLst>
+                    </p:cTn>
+                  </p:par>
+                  <p:par>
+                    <p:cTn id="9" fill="hold">
+                      <p:stCondLst>
+                        <p:cond delay="indefinite"/>
+                      </p:stCondLst>
+                      <p:childTnLst>
+                        <p:par>
+                          <p:cTn id="10" fill="hold">
+                            <p:stCondLst>
+                              <p:cond delay="0"/>
+                            </p:stCondLst>
+                            <p:childTnLst>
                               <p:par>
-                                <p:cTn id="11" presetID="1" presetClass="entr" presetSubtype="0" fill="hold" nodeType="withEffect">
+                                <p:cTn id="11" presetID="1" presetClass="entr" presetSubtype="0" fill="hold" nodeType="clickEffect">
                                   <p:stCondLst>
                                     <p:cond delay="0"/>
                                   </p:stCondLst>
@@ -39254,7 +39646,11 @@
                                           </p:stCondLst>
                                         </p:cTn>
                                         <p:tgtEl>
-                                          <p:spTgt spid="5"/>
+                                          <p:spTgt spid="6">
+                                            <p:txEl>
+                                              <p:pRg st="1" end="1"/>
+                                            </p:txEl>
+                                          </p:spTgt>
                                         </p:tgtEl>
                                         <p:attrNameLst>
                                           <p:attrName>style.visibility</p:attrName>
@@ -39518,6 +39914,55 @@
                       </p:childTnLst>
                     </p:cTn>
                   </p:par>
+                  <p:par>
+                    <p:cTn id="33" fill="hold">
+                      <p:stCondLst>
+                        <p:cond delay="indefinite"/>
+                      </p:stCondLst>
+                      <p:childTnLst>
+                        <p:par>
+                          <p:cTn id="34" fill="hold">
+                            <p:stCondLst>
+                              <p:cond delay="0"/>
+                            </p:stCondLst>
+                            <p:childTnLst>
+                              <p:par>
+                                <p:cTn id="35" presetID="1" presetClass="entr" presetSubtype="0" fill="hold" nodeType="clickEffect">
+                                  <p:stCondLst>
+                                    <p:cond delay="0"/>
+                                  </p:stCondLst>
+                                  <p:childTnLst>
+                                    <p:set>
+                                      <p:cBhvr>
+                                        <p:cTn id="36" dur="1" fill="hold">
+                                          <p:stCondLst>
+                                            <p:cond delay="0"/>
+                                          </p:stCondLst>
+                                        </p:cTn>
+                                        <p:tgtEl>
+                                          <p:spTgt spid="6">
+                                            <p:txEl>
+                                              <p:pRg st="7" end="7"/>
+                                            </p:txEl>
+                                          </p:spTgt>
+                                        </p:tgtEl>
+                                        <p:attrNameLst>
+                                          <p:attrName>style.visibility</p:attrName>
+                                        </p:attrNameLst>
+                                      </p:cBhvr>
+                                      <p:to>
+                                        <p:strVal val="visible"/>
+                                      </p:to>
+                                    </p:set>
+                                  </p:childTnLst>
+                                </p:cTn>
+                              </p:par>
+                            </p:childTnLst>
+                          </p:cTn>
+                        </p:par>
+                      </p:childTnLst>
+                    </p:cTn>
+                  </p:par>
                 </p:childTnLst>
               </p:cTn>
               <p:prevCondLst>
@@ -39544,7 +39989,7 @@
 </file>
 
 <file path=ppt/slides/slide45.xml><?xml version="1.0" encoding="utf-8"?>
-<p:sld xmlns:a="http://schemas.openxmlformats.org/drawingml/2006/main" xmlns:r="http://schemas.openxmlformats.org/officeDocument/2006/relationships" xmlns:p="http://schemas.openxmlformats.org/presentationml/2006/main" show="0">
+<p:sld xmlns:a="http://schemas.openxmlformats.org/drawingml/2006/main" xmlns:r="http://schemas.openxmlformats.org/officeDocument/2006/relationships" xmlns:p="http://schemas.openxmlformats.org/presentationml/2006/main">
   <p:cSld>
     <p:spTree>
       <p:nvGrpSpPr>
@@ -39646,7 +40091,7 @@
             <p:spPr>
               <a:xfrm>
                 <a:off x="396498" y="1709893"/>
-                <a:ext cx="5584552" cy="3970318"/>
+                <a:ext cx="5851902" cy="3970318"/>
               </a:xfrm>
               <a:prstGeom prst="rect">
                 <a:avLst/>
@@ -39709,7 +40154,7 @@
                 </a:r>
               </a:p>
               <a:p>
-                <a:pPr marL="285750" indent="-285750">
+                <a:pPr marL="742950" lvl="1" indent="-285750">
                   <a:buFont typeface="Arial" panose="020B0604020202020204" pitchFamily="34" charset="0"/>
                   <a:buChar char="•"/>
                 </a:pPr>
@@ -39761,7 +40206,7 @@
                 </a:r>
               </a:p>
               <a:p>
-                <a:pPr marL="285750" indent="-285750">
+                <a:pPr marL="742950" lvl="1" indent="-285750">
                   <a:buFont typeface="Arial" panose="020B0604020202020204" pitchFamily="34" charset="0"/>
                   <a:buChar char="•"/>
                 </a:pPr>
@@ -39817,7 +40262,7 @@
                 <a:endParaRPr lang="en-US" sz="2800" dirty="0"/>
               </a:p>
               <a:p>
-                <a:pPr marL="285750" indent="-285750">
+                <a:pPr marL="742950" lvl="1" indent="-285750">
                   <a:buFont typeface="Arial" panose="020B0604020202020204" pitchFamily="34" charset="0"/>
                   <a:buChar char="•"/>
                 </a:pPr>
@@ -39873,7 +40318,56 @@
                 <a:endParaRPr lang="en-US" sz="2800" dirty="0"/>
               </a:p>
               <a:p>
-                <a:pPr marL="285750" indent="-285750">
+                <a:pPr marL="742950" lvl="1" indent="-285750">
+                  <a:buFont typeface="Arial" panose="020B0604020202020204" pitchFamily="34" charset="0"/>
+                  <a:buChar char="•"/>
+                </a:pPr>
+                <a:r>
+                  <a:rPr lang="en-US" sz="2800" dirty="0"/>
+                  <a:t>Lower </a:t>
+                </a:r>
+                <a14:m>
+                  <m:oMath xmlns:m="http://schemas.openxmlformats.org/officeDocument/2006/math">
+                    <m:r>
+                      <a:rPr lang="en-US" sz="2800" i="1">
+                        <a:latin typeface="Cambria Math" panose="02040503050406030204" pitchFamily="18" charset="0"/>
+                      </a:rPr>
+                      <m:t>𝑟</m:t>
+                    </m:r>
+                    <m:r>
+                      <a:rPr lang="en-US" sz="2800" i="1">
+                        <a:latin typeface="Cambria Math" panose="02040503050406030204" pitchFamily="18" charset="0"/>
+                        <a:ea typeface="Cambria Math" panose="02040503050406030204" pitchFamily="18" charset="0"/>
+                      </a:rPr>
+                      <m:t>⟶</m:t>
+                    </m:r>
+                    <m:r>
+                      <a:rPr lang="en-US" sz="2800" i="1">
+                        <a:latin typeface="Cambria Math" panose="02040503050406030204" pitchFamily="18" charset="0"/>
+                        <a:ea typeface="Cambria Math" panose="02040503050406030204" pitchFamily="18" charset="0"/>
+                      </a:rPr>
+                      <m:t>𝑚𝑜𝑟𝑒</m:t>
+                    </m:r>
+                    <m:r>
+                      <a:rPr lang="en-US" sz="2800" i="1">
+                        <a:latin typeface="Cambria Math" panose="02040503050406030204" pitchFamily="18" charset="0"/>
+                        <a:ea typeface="Cambria Math" panose="02040503050406030204" pitchFamily="18" charset="0"/>
+                      </a:rPr>
+                      <m:t> </m:t>
+                    </m:r>
+                    <m:r>
+                      <a:rPr lang="en-US" sz="2800" i="1">
+                        <a:latin typeface="Cambria Math" panose="02040503050406030204" pitchFamily="18" charset="0"/>
+                        <a:ea typeface="Cambria Math" panose="02040503050406030204" pitchFamily="18" charset="0"/>
+                      </a:rPr>
+                      <m:t>𝑎𝑝𝑝𝑟𝑜𝑥𝑖𝑚𝑎𝑡𝑒</m:t>
+                    </m:r>
+                  </m:oMath>
+                </a14:m>
+                <a:endParaRPr lang="en-US" sz="2800" dirty="0"/>
+              </a:p>
+              <a:p>
+                <a:pPr marL="742950" lvl="1" indent="-285750">
                   <a:buFont typeface="Arial" panose="020B0604020202020204" pitchFamily="34" charset="0"/>
                   <a:buChar char="•"/>
                 </a:pPr>
@@ -39901,21 +40395,7 @@
                         <a:latin typeface="Cambria Math" panose="02040503050406030204" pitchFamily="18" charset="0"/>
                         <a:ea typeface="Cambria Math" panose="02040503050406030204" pitchFamily="18" charset="0"/>
                       </a:rPr>
-                      <m:t>𝑝𝑜𝑠𝑠𝑖𝑏𝑙𝑒</m:t>
-                    </m:r>
-                    <m:r>
-                      <a:rPr lang="en-US" sz="2800" b="0" i="1" smtClean="0">
-                        <a:latin typeface="Cambria Math" panose="02040503050406030204" pitchFamily="18" charset="0"/>
-                        <a:ea typeface="Cambria Math" panose="02040503050406030204" pitchFamily="18" charset="0"/>
-                      </a:rPr>
-                      <m:t> </m:t>
-                    </m:r>
-                    <m:r>
-                      <a:rPr lang="en-US" sz="2800" b="0" i="1" smtClean="0">
-                        <a:latin typeface="Cambria Math" panose="02040503050406030204" pitchFamily="18" charset="0"/>
-                        <a:ea typeface="Cambria Math" panose="02040503050406030204" pitchFamily="18" charset="0"/>
-                      </a:rPr>
-                      <m:t>𝑑𝑖𝑠𝑐𝑜𝑛𝑛𝑒𝑐𝑡𝑒𝑑</m:t>
+                      <m:t>𝑑𝑖𝑠𝑐𝑜𝑛𝑛𝑒𝑐𝑡𝑠</m:t>
                     </m:r>
                     <m:r>
                       <a:rPr lang="en-US" sz="2800" b="0" i="1" smtClean="0">
@@ -39956,7 +40436,7 @@
             <p:spPr>
               <a:xfrm>
                 <a:off x="396498" y="1709893"/>
-                <a:ext cx="5584552" cy="3970318"/>
+                <a:ext cx="5851902" cy="3970318"/>
               </a:xfrm>
               <a:prstGeom prst="rect">
                 <a:avLst/>
@@ -39964,7 +40444,7 @@
               <a:blipFill>
                 <a:blip r:embed="rId3"/>
                 <a:stretch>
-                  <a:fillRect l="-1965" t="-1380"/>
+                  <a:fillRect l="-1875" t="-1380" b="-3374"/>
                 </a:stretch>
               </a:blipFill>
             </p:spPr>
@@ -40074,6 +40554,33 @@
                                   </p:childTnLst>
                                 </p:cTn>
                               </p:par>
+                              <p:par>
+                                <p:cTn id="7" presetID="1" presetClass="entr" presetSubtype="0" fill="hold" nodeType="withEffect">
+                                  <p:stCondLst>
+                                    <p:cond delay="0"/>
+                                  </p:stCondLst>
+                                  <p:childTnLst>
+                                    <p:set>
+                                      <p:cBhvr>
+                                        <p:cTn id="8" dur="1" fill="hold">
+                                          <p:stCondLst>
+                                            <p:cond delay="0"/>
+                                          </p:stCondLst>
+                                        </p:cTn>
+                                        <p:tgtEl>
+                                          <p:spTgt spid="7"/>
+                                        </p:tgtEl>
+                                        <p:attrNameLst>
+                                          <p:attrName>style.visibility</p:attrName>
+                                        </p:attrNameLst>
+                                      </p:cBhvr>
+                                      <p:to>
+                                        <p:strVal val="visible"/>
+                                      </p:to>
+                                    </p:set>
+                                  </p:childTnLst>
+                                </p:cTn>
+                              </p:par>
                             </p:childTnLst>
                           </p:cTn>
                         </p:par>
@@ -40081,26 +40588,26 @@
                     </p:cTn>
                   </p:par>
                   <p:par>
-                    <p:cTn id="7" fill="hold">
+                    <p:cTn id="9" fill="hold">
                       <p:stCondLst>
                         <p:cond delay="indefinite"/>
                       </p:stCondLst>
                       <p:childTnLst>
                         <p:par>
-                          <p:cTn id="8" fill="hold">
+                          <p:cTn id="10" fill="hold">
                             <p:stCondLst>
                               <p:cond delay="0"/>
                             </p:stCondLst>
                             <p:childTnLst>
                               <p:par>
-                                <p:cTn id="9" presetID="1" presetClass="entr" presetSubtype="0" fill="hold" nodeType="clickEffect">
+                                <p:cTn id="11" presetID="1" presetClass="entr" presetSubtype="0" fill="hold" nodeType="clickEffect">
                                   <p:stCondLst>
                                     <p:cond delay="0"/>
                                   </p:stCondLst>
                                   <p:childTnLst>
                                     <p:set>
                                       <p:cBhvr>
-                                        <p:cTn id="10" dur="1" fill="hold">
+                                        <p:cTn id="12" dur="1" fill="hold">
                                           <p:stCondLst>
                                             <p:cond delay="0"/>
                                           </p:stCondLst>
@@ -40130,26 +40637,26 @@
                     </p:cTn>
                   </p:par>
                   <p:par>
-                    <p:cTn id="11" fill="hold">
+                    <p:cTn id="13" fill="hold">
                       <p:stCondLst>
                         <p:cond delay="indefinite"/>
                       </p:stCondLst>
                       <p:childTnLst>
                         <p:par>
-                          <p:cTn id="12" fill="hold">
+                          <p:cTn id="14" fill="hold">
                             <p:stCondLst>
                               <p:cond delay="0"/>
                             </p:stCondLst>
                             <p:childTnLst>
                               <p:par>
-                                <p:cTn id="13" presetID="1" presetClass="entr" presetSubtype="0" fill="hold" nodeType="clickEffect">
+                                <p:cTn id="15" presetID="1" presetClass="entr" presetSubtype="0" fill="hold" nodeType="clickEffect">
                                   <p:stCondLst>
                                     <p:cond delay="0"/>
                                   </p:stCondLst>
                                   <p:childTnLst>
                                     <p:set>
                                       <p:cBhvr>
-                                        <p:cTn id="14" dur="1" fill="hold">
+                                        <p:cTn id="16" dur="1" fill="hold">
                                           <p:stCondLst>
                                             <p:cond delay="0"/>
                                           </p:stCondLst>
@@ -40179,26 +40686,26 @@
                     </p:cTn>
                   </p:par>
                   <p:par>
-                    <p:cTn id="15" fill="hold">
+                    <p:cTn id="17" fill="hold">
                       <p:stCondLst>
                         <p:cond delay="indefinite"/>
                       </p:stCondLst>
                       <p:childTnLst>
                         <p:par>
-                          <p:cTn id="16" fill="hold">
+                          <p:cTn id="18" fill="hold">
                             <p:stCondLst>
                               <p:cond delay="0"/>
                             </p:stCondLst>
                             <p:childTnLst>
                               <p:par>
-                                <p:cTn id="17" presetID="1" presetClass="entr" presetSubtype="0" fill="hold" nodeType="clickEffect">
+                                <p:cTn id="19" presetID="1" presetClass="entr" presetSubtype="0" fill="hold" nodeType="clickEffect">
                                   <p:stCondLst>
                                     <p:cond delay="0"/>
                                   </p:stCondLst>
                                   <p:childTnLst>
                                     <p:set>
                                       <p:cBhvr>
-                                        <p:cTn id="18" dur="1" fill="hold">
+                                        <p:cTn id="20" dur="1" fill="hold">
                                           <p:stCondLst>
                                             <p:cond delay="0"/>
                                           </p:stCondLst>
@@ -40228,26 +40735,26 @@
                     </p:cTn>
                   </p:par>
                   <p:par>
-                    <p:cTn id="19" fill="hold">
+                    <p:cTn id="21" fill="hold">
                       <p:stCondLst>
                         <p:cond delay="indefinite"/>
                       </p:stCondLst>
                       <p:childTnLst>
                         <p:par>
-                          <p:cTn id="20" fill="hold">
+                          <p:cTn id="22" fill="hold">
                             <p:stCondLst>
                               <p:cond delay="0"/>
                             </p:stCondLst>
                             <p:childTnLst>
                               <p:par>
-                                <p:cTn id="21" presetID="1" presetClass="entr" presetSubtype="0" fill="hold" nodeType="clickEffect">
+                                <p:cTn id="23" presetID="1" presetClass="entr" presetSubtype="0" fill="hold" nodeType="clickEffect">
                                   <p:stCondLst>
                                     <p:cond delay="0"/>
                                   </p:stCondLst>
                                   <p:childTnLst>
                                     <p:set>
                                       <p:cBhvr>
-                                        <p:cTn id="22" dur="1" fill="hold">
+                                        <p:cTn id="24" dur="1" fill="hold">
                                           <p:stCondLst>
                                             <p:cond delay="0"/>
                                           </p:stCondLst>
@@ -40277,26 +40784,26 @@
                     </p:cTn>
                   </p:par>
                   <p:par>
-                    <p:cTn id="23" fill="hold">
+                    <p:cTn id="25" fill="hold">
                       <p:stCondLst>
                         <p:cond delay="indefinite"/>
                       </p:stCondLst>
                       <p:childTnLst>
                         <p:par>
-                          <p:cTn id="24" fill="hold">
+                          <p:cTn id="26" fill="hold">
                             <p:stCondLst>
                               <p:cond delay="0"/>
                             </p:stCondLst>
                             <p:childTnLst>
                               <p:par>
-                                <p:cTn id="25" presetID="1" presetClass="entr" presetSubtype="0" fill="hold" nodeType="clickEffect">
+                                <p:cTn id="27" presetID="1" presetClass="entr" presetSubtype="0" fill="hold" nodeType="clickEffect">
                                   <p:stCondLst>
                                     <p:cond delay="0"/>
                                   </p:stCondLst>
                                   <p:childTnLst>
                                     <p:set>
                                       <p:cBhvr>
-                                        <p:cTn id="26" dur="1" fill="hold">
+                                        <p:cTn id="28" dur="1" fill="hold">
                                           <p:stCondLst>
                                             <p:cond delay="0"/>
                                           </p:stCondLst>
@@ -40326,26 +40833,26 @@
                     </p:cTn>
                   </p:par>
                   <p:par>
-                    <p:cTn id="27" fill="hold">
+                    <p:cTn id="29" fill="hold">
                       <p:stCondLst>
                         <p:cond delay="indefinite"/>
                       </p:stCondLst>
                       <p:childTnLst>
                         <p:par>
-                          <p:cTn id="28" fill="hold">
+                          <p:cTn id="30" fill="hold">
                             <p:stCondLst>
                               <p:cond delay="0"/>
                             </p:stCondLst>
                             <p:childTnLst>
                               <p:par>
-                                <p:cTn id="29" presetID="1" presetClass="entr" presetSubtype="0" fill="hold" nodeType="clickEffect">
+                                <p:cTn id="31" presetID="1" presetClass="entr" presetSubtype="0" fill="hold" nodeType="clickEffect">
                                   <p:stCondLst>
                                     <p:cond delay="0"/>
                                   </p:stCondLst>
                                   <p:childTnLst>
                                     <p:set>
                                       <p:cBhvr>
-                                        <p:cTn id="30" dur="1" fill="hold">
+                                        <p:cTn id="32" dur="1" fill="hold">
                                           <p:stCondLst>
                                             <p:cond delay="0"/>
                                           </p:stCondLst>
@@ -40368,21 +40875,43 @@
                                   </p:childTnLst>
                                 </p:cTn>
                               </p:par>
+                            </p:childTnLst>
+                          </p:cTn>
+                        </p:par>
+                      </p:childTnLst>
+                    </p:cTn>
+                  </p:par>
+                  <p:par>
+                    <p:cTn id="33" fill="hold">
+                      <p:stCondLst>
+                        <p:cond delay="indefinite"/>
+                      </p:stCondLst>
+                      <p:childTnLst>
+                        <p:par>
+                          <p:cTn id="34" fill="hold">
+                            <p:stCondLst>
+                              <p:cond delay="0"/>
+                            </p:stCondLst>
+                            <p:childTnLst>
                               <p:par>
-                                <p:cTn id="31" presetID="1" presetClass="entr" presetSubtype="0" fill="hold" nodeType="withEffect">
+                                <p:cTn id="35" presetID="1" presetClass="entr" presetSubtype="0" fill="hold" nodeType="clickEffect">
                                   <p:stCondLst>
                                     <p:cond delay="0"/>
                                   </p:stCondLst>
                                   <p:childTnLst>
                                     <p:set>
                                       <p:cBhvr>
-                                        <p:cTn id="32" dur="1" fill="hold">
+                                        <p:cTn id="36" dur="1" fill="hold">
                                           <p:stCondLst>
                                             <p:cond delay="0"/>
                                           </p:stCondLst>
                                         </p:cTn>
                                         <p:tgtEl>
-                                          <p:spTgt spid="7"/>
+                                          <p:spTgt spid="6">
+                                            <p:txEl>
+                                              <p:pRg st="7" end="7"/>
+                                            </p:txEl>
+                                          </p:spTgt>
                                         </p:tgtEl>
                                         <p:attrNameLst>
                                           <p:attrName>style.visibility</p:attrName>
@@ -40589,13 +41118,21 @@
               <a:rPr lang="en-US" dirty="0">
                 <a:latin typeface="+mn-lt"/>
               </a:rPr>
-              <a:t>Can transform from similarity to </a:t>
+              <a:t>Can transform from similarity to distance </a:t>
+            </a:r>
+          </a:p>
+          <a:p>
+            <a:r>
+              <a:rPr lang="en-US" sz="2800" dirty="0">
+                <a:latin typeface="+mn-lt"/>
+              </a:rPr>
+              <a:t>Use </a:t>
             </a:r>
             <a:r>
-              <a:rPr lang="en-US">
+              <a:rPr lang="en-US" dirty="0">
                 <a:latin typeface="+mn-lt"/>
               </a:rPr>
-              <a:t>distance </a:t>
+              <a:t>sparse graph representation to massively improve scalability</a:t>
             </a:r>
             <a:endParaRPr lang="en-US" sz="2800" dirty="0">
               <a:latin typeface="+mn-lt"/>
@@ -40736,8 +41273,8 @@
           </a:p>
         </p:txBody>
       </p:sp>
-      <mc:AlternateContent xmlns:mc="http://schemas.openxmlformats.org/markup-compatibility/2006" xmlns:a14="http://schemas.microsoft.com/office/drawing/2010/main">
-        <mc:Choice Requires="a14">
+      <mc:AlternateContent xmlns:mc="http://schemas.openxmlformats.org/markup-compatibility/2006">
+        <mc:Choice xmlns:a14="http://schemas.microsoft.com/office/drawing/2010/main" Requires="a14">
           <p:sp>
             <p:nvSpPr>
               <p:cNvPr id="3" name="Content Placeholder 2"/>
@@ -40802,7 +41339,13 @@
                   <a:rPr lang="en-US" dirty="0">
                     <a:latin typeface="+mn-lt"/>
                   </a:rPr>
-                  <a:t>are vector valued</a:t>
+                  <a:t>are </a:t>
+                </a:r>
+                <a:r>
+                  <a:rPr lang="en-US" b="1" dirty="0">
+                    <a:latin typeface="+mn-lt"/>
+                  </a:rPr>
+                  <a:t>vector valued</a:t>
                 </a:r>
               </a:p>
               <a:p>
@@ -40810,7 +41353,13 @@
                   <a:rPr lang="en-US" dirty="0">
                     <a:latin typeface="+mn-lt"/>
                   </a:rPr>
-                  <a:t>Distance and similarity are scalar values </a:t>
+                  <a:t>Distance and similarity are </a:t>
+                </a:r>
+                <a:r>
+                  <a:rPr lang="en-US" b="1" dirty="0">
+                    <a:latin typeface="+mn-lt"/>
+                  </a:rPr>
+                  <a:t>scalar values </a:t>
                 </a:r>
               </a:p>
               <a:p>
@@ -40818,13 +41367,13 @@
                   <a:rPr lang="en-US" sz="3200" dirty="0">
                     <a:latin typeface="+mn-lt"/>
                   </a:rPr>
-                  <a:t>Distance (similarity) metrics map </a:t>
+                  <a:t>Distance (similarity) metrics </a:t>
                 </a:r>
                 <a:r>
                   <a:rPr lang="en-US" sz="3200" b="1" dirty="0">
                     <a:latin typeface="+mn-lt"/>
                   </a:rPr>
-                  <a:t>two vector valued variables </a:t>
+                  <a:t>map two vector valued variables </a:t>
                 </a:r>
                 <a:r>
                   <a:rPr lang="en-US" sz="3200" dirty="0">
@@ -40850,7 +41399,7 @@
                     </m:oMathParaPr>
                     <m:oMath xmlns:m="http://schemas.openxmlformats.org/officeDocument/2006/math">
                       <m:r>
-                        <a:rPr lang="en-US" sz="3200" b="0" i="1" smtClean="0">
+                        <a:rPr lang="en-US" sz="3200" i="1">
                           <a:latin typeface="Cambria Math" panose="02040503050406030204" pitchFamily="18" charset="0"/>
                         </a:rPr>
                         <m:t>𝑑</m:t>
@@ -40858,7 +41407,7 @@
                       <m:d>
                         <m:dPr>
                           <m:ctrlPr>
-                            <a:rPr lang="en-US" sz="3200" i="1" smtClean="0">
+                            <a:rPr lang="en-US" sz="3200" i="1">
                               <a:latin typeface="Cambria Math" panose="02040503050406030204" pitchFamily="18" charset="0"/>
                             </a:rPr>
                           </m:ctrlPr>
@@ -40867,14 +41416,14 @@
                           <m:sSub>
                             <m:sSubPr>
                               <m:ctrlPr>
-                                <a:rPr lang="en-US" sz="3200" i="1" smtClean="0">
+                                <a:rPr lang="en-US" sz="3200" i="1">
                                   <a:latin typeface="Cambria Math" panose="02040503050406030204" pitchFamily="18" charset="0"/>
                                 </a:rPr>
                               </m:ctrlPr>
                             </m:sSubPr>
                             <m:e>
                               <m:r>
-                                <a:rPr lang="en-US" sz="3200" b="0" i="1" smtClean="0">
+                                <a:rPr lang="en-US" sz="3200" i="1">
                                   <a:latin typeface="Cambria Math" panose="02040503050406030204" pitchFamily="18" charset="0"/>
                                 </a:rPr>
                                 <m:t>𝑥</m:t>
@@ -40882,7 +41431,7 @@
                             </m:e>
                             <m:sub>
                               <m:r>
-                                <a:rPr lang="en-US" sz="3200" b="0" i="1" smtClean="0">
+                                <a:rPr lang="en-US" sz="3200" i="1">
                                   <a:latin typeface="Cambria Math" panose="02040503050406030204" pitchFamily="18" charset="0"/>
                                 </a:rPr>
                                 <m:t>𝑖</m:t>
@@ -40890,7 +41439,7 @@
                             </m:sub>
                           </m:sSub>
                           <m:r>
-                            <a:rPr lang="en-US" sz="3200" b="0" i="1" smtClean="0">
+                            <a:rPr lang="en-US" sz="3200" i="1">
                               <a:latin typeface="Cambria Math" panose="02040503050406030204" pitchFamily="18" charset="0"/>
                             </a:rPr>
                             <m:t>,</m:t>
@@ -40898,14 +41447,14 @@
                           <m:sSub>
                             <m:sSubPr>
                               <m:ctrlPr>
-                                <a:rPr lang="en-US" sz="3200" i="1" smtClean="0">
+                                <a:rPr lang="en-US" sz="3200" i="1">
                                   <a:latin typeface="Cambria Math" panose="02040503050406030204" pitchFamily="18" charset="0"/>
                                 </a:rPr>
                               </m:ctrlPr>
                             </m:sSubPr>
                             <m:e>
                               <m:r>
-                                <a:rPr lang="en-US" sz="3200" b="0" i="1" smtClean="0">
+                                <a:rPr lang="en-US" sz="3200" i="1">
                                   <a:latin typeface="Cambria Math" panose="02040503050406030204" pitchFamily="18" charset="0"/>
                                 </a:rPr>
                                 <m:t>𝑥</m:t>
@@ -40913,7 +41462,7 @@
                             </m:e>
                             <m:sub>
                               <m:r>
-                                <a:rPr lang="en-US" sz="3200" b="0" i="1" smtClean="0">
+                                <a:rPr lang="en-US" sz="3200" i="1">
                                   <a:latin typeface="Cambria Math" panose="02040503050406030204" pitchFamily="18" charset="0"/>
                                 </a:rPr>
                                 <m:t>𝑗</m:t>
@@ -40922,6 +41471,43 @@
                           </m:sSub>
                         </m:e>
                       </m:d>
+                      <m:r>
+                        <a:rPr lang="en-US" sz="3200" i="1" smtClean="0">
+                          <a:latin typeface="Cambria Math" panose="02040503050406030204" pitchFamily="18" charset="0"/>
+                          <a:ea typeface="Cambria Math" panose="02040503050406030204" pitchFamily="18" charset="0"/>
+                        </a:rPr>
+                        <m:t>→</m:t>
+                      </m:r>
+                      <m:r>
+                        <a:rPr lang="en-US" sz="3200" b="0" i="1" smtClean="0">
+                          <a:latin typeface="Cambria Math" panose="02040503050406030204" pitchFamily="18" charset="0"/>
+                          <a:ea typeface="Cambria Math" panose="02040503050406030204" pitchFamily="18" charset="0"/>
+                        </a:rPr>
+                        <m:t>𝑠</m:t>
+                      </m:r>
+                    </m:oMath>
+                  </m:oMathPara>
+                </a14:m>
+                <a:endParaRPr lang="en-US" sz="3200" b="1" dirty="0">
+                  <a:latin typeface="+mn-lt"/>
+                </a:endParaRPr>
+              </a:p>
+              <a:p>
+                <a:pPr marL="0" indent="0">
+                  <a:buNone/>
+                </a:pPr>
+                <a14:m>
+                  <m:oMathPara xmlns:m="http://schemas.openxmlformats.org/officeDocument/2006/math">
+                    <m:oMathParaPr>
+                      <m:jc m:val="centerGroup"/>
+                    </m:oMathParaPr>
+                    <m:oMath xmlns:m="http://schemas.openxmlformats.org/officeDocument/2006/math">
+                      <m:r>
+                        <a:rPr lang="en-US" sz="3200" b="0" i="1" smtClean="0">
+                          <a:latin typeface="Cambria Math" panose="02040503050406030204" pitchFamily="18" charset="0"/>
+                        </a:rPr>
+                        <m:t>𝑠</m:t>
+                      </m:r>
                       <m:r>
                         <a:rPr lang="en-US" sz="3200" b="0" i="1" smtClean="0">
                           <a:latin typeface="Cambria Math" panose="02040503050406030204" pitchFamily="18" charset="0"/>
@@ -41065,7 +41651,7 @@
             </p:txBody>
           </p:sp>
         </mc:Choice>
-        <mc:Fallback xmlns="">
+        <mc:Fallback>
           <p:sp>
             <p:nvSpPr>
               <p:cNvPr id="3" name="Content Placeholder 2"/>
@@ -41084,7 +41670,7 @@
               <a:blipFill>
                 <a:blip r:embed="rId3"/>
                 <a:stretch>
-                  <a:fillRect l="-1217" t="-1959" r="-106"/>
+                  <a:fillRect l="-1217" t="-1959" r="-212"/>
                 </a:stretch>
               </a:blipFill>
             </p:spPr>
@@ -41279,6 +41865,37 @@
                                           <p:spTgt spid="3">
                                             <p:txEl>
                                               <p:pRg st="4" end="4"/>
+                                            </p:txEl>
+                                          </p:spTgt>
+                                        </p:tgtEl>
+                                        <p:attrNameLst>
+                                          <p:attrName>style.visibility</p:attrName>
+                                        </p:attrNameLst>
+                                      </p:cBhvr>
+                                      <p:to>
+                                        <p:strVal val="visible"/>
+                                      </p:to>
+                                    </p:set>
+                                  </p:childTnLst>
+                                </p:cTn>
+                              </p:par>
+                              <p:par>
+                                <p:cTn id="17" presetID="1" presetClass="entr" presetSubtype="0" fill="hold" nodeType="withEffect">
+                                  <p:stCondLst>
+                                    <p:cond delay="0"/>
+                                  </p:stCondLst>
+                                  <p:childTnLst>
+                                    <p:set>
+                                      <p:cBhvr>
+                                        <p:cTn id="18" dur="1" fill="hold">
+                                          <p:stCondLst>
+                                            <p:cond delay="0"/>
+                                          </p:stCondLst>
+                                        </p:cTn>
+                                        <p:tgtEl>
+                                          <p:spTgt spid="3">
+                                            <p:txEl>
+                                              <p:pRg st="5" end="5"/>
                                             </p:txEl>
                                           </p:spTgt>
                                         </p:tgtEl>

</xml_diff>